<commit_message>
feat: filecoin video libai
</commit_message>
<xml_diff>
--- a/filecoin/filecoin_share.pptx
+++ b/filecoin/filecoin_share.pptx
@@ -8911,10 +8911,14 @@
                 <a:latin typeface="Arial"/>
                 <a:ea typeface="DejaVu Sans" panose="020B0603030804020204"/>
               </a:rPr>
-              <a:t>任务计划</a:t>
-            </a:r>
-            <a:endParaRPr lang="en-US" sz="4400" b="0" strike="noStrike" spc="-1">
-              <a:latin typeface="Arial"/>
+              <a:t>任务模块</a:t>
+            </a:r>
+            <a:endParaRPr lang="en-US" altLang="zh-CN" sz="4400" b="0" strike="noStrike" spc="-1">
+              <a:solidFill>
+                <a:srgbClr val="000000"/>
+              </a:solidFill>
+              <a:latin typeface="Arial"/>
+              <a:ea typeface="DejaVu Sans" panose="020B0603030804020204"/>
             </a:endParaRPr>
           </a:p>
         </p:txBody>

</xml_diff>